<commit_message>
New files for many things
</commit_message>
<xml_diff>
--- a/Documents for Progress/ttX_StatusReport.pptx
+++ b/Documents for Progress/ttX_StatusReport.pptx
@@ -6,16 +6,17 @@
     <p:sldMasterId id="2147483661" r:id="rId2"/>
   </p:sldMasterIdLst>
   <p:notesMasterIdLst>
-    <p:notesMasterId r:id="rId7"/>
+    <p:notesMasterId r:id="rId8"/>
   </p:notesMasterIdLst>
   <p:handoutMasterIdLst>
-    <p:handoutMasterId r:id="rId8"/>
+    <p:handoutMasterId r:id="rId9"/>
   </p:handoutMasterIdLst>
   <p:sldIdLst>
     <p:sldId id="256" r:id="rId3"/>
     <p:sldId id="454" r:id="rId4"/>
     <p:sldId id="461" r:id="rId5"/>
-    <p:sldId id="457" r:id="rId6"/>
+    <p:sldId id="462" r:id="rId6"/>
+    <p:sldId id="457" r:id="rId7"/>
   </p:sldIdLst>
   <p:sldSz cx="12192000" cy="6858000"/>
   <p:notesSz cx="6858000" cy="9144000"/>
@@ -207,7 +208,7 @@
           <a:p>
             <a:fld id="{583CC2C3-D46D-0343-83E9-B9976888F0E9}" type="datetime1">
               <a:rPr lang="en-US" smtClean="0"/>
-              <a:t>10/8/19</a:t>
+              <a:t>10/16/19</a:t>
             </a:fld>
             <a:endParaRPr lang="en-GB"/>
           </a:p>
@@ -413,7 +414,7 @@
           <a:p>
             <a:fld id="{19F12253-0319-144B-AAFD-D9E6A0D780CE}" type="datetime1">
               <a:rPr lang="en-US" smtClean="0"/>
-              <a:t>10/8/19</a:t>
+              <a:t>10/16/19</a:t>
             </a:fld>
             <a:endParaRPr lang="en-GB"/>
           </a:p>
@@ -747,7 +748,7 @@
           <a:p>
             <a:fld id="{389CCCAF-BF02-DB48-BF0A-A3144B52B80B}" type="datetime1">
               <a:rPr lang="en-US" smtClean="0"/>
-              <a:t>10/8/19</a:t>
+              <a:t>10/16/19</a:t>
             </a:fld>
             <a:endParaRPr lang="en-GB"/>
           </a:p>
@@ -1015,7 +1016,7 @@
           <a:p>
             <a:fld id="{E443F577-7DB0-9440-B29D-0D4E3CC01093}" type="datetime1">
               <a:rPr lang="en-US" smtClean="0"/>
-              <a:t>10/8/19</a:t>
+              <a:t>10/16/19</a:t>
             </a:fld>
             <a:endParaRPr lang="en-US" dirty="0"/>
           </a:p>
@@ -1222,7 +1223,7 @@
           <a:p>
             <a:fld id="{31054C0D-5B7B-BB4A-A276-749670FA0B34}" type="datetime1">
               <a:rPr lang="en-US" smtClean="0"/>
-              <a:t>10/8/19</a:t>
+              <a:t>10/16/19</a:t>
             </a:fld>
             <a:endParaRPr lang="en-US" dirty="0"/>
           </a:p>
@@ -1477,7 +1478,7 @@
           <a:p>
             <a:fld id="{9710EB85-433E-3048-AF66-FE6D578CFF87}" type="datetime1">
               <a:rPr lang="en-US" smtClean="0"/>
-              <a:t>10/8/19</a:t>
+              <a:t>10/16/19</a:t>
             </a:fld>
             <a:endParaRPr lang="en-US" dirty="0"/>
           </a:p>
@@ -1668,7 +1669,7 @@
           <a:p>
             <a:fld id="{AC6D74DA-6909-B948-B468-15190DC0B045}" type="datetime1">
               <a:rPr lang="en-US" smtClean="0"/>
-              <a:t>10/8/19</a:t>
+              <a:t>10/16/19</a:t>
             </a:fld>
             <a:endParaRPr lang="en-GB"/>
           </a:p>
@@ -1842,7 +1843,7 @@
           <a:p>
             <a:fld id="{D5465405-E699-2341-82E8-21456B116620}" type="datetime1">
               <a:rPr lang="en-US" smtClean="0"/>
-              <a:t>10/8/19</a:t>
+              <a:t>10/16/19</a:t>
             </a:fld>
             <a:endParaRPr lang="en-GB"/>
           </a:p>
@@ -2092,7 +2093,7 @@
           <a:p>
             <a:fld id="{A7E2410F-D375-FE43-8412-1984541F6502}" type="datetime1">
               <a:rPr lang="en-US" smtClean="0"/>
-              <a:t>10/8/19</a:t>
+              <a:t>10/16/19</a:t>
             </a:fld>
             <a:endParaRPr lang="en-GB"/>
           </a:p>
@@ -2328,7 +2329,7 @@
           <a:p>
             <a:fld id="{6A44C8A0-C8AE-DF4E-8F63-DB5002B17AF5}" type="datetime1">
               <a:rPr lang="en-US" smtClean="0"/>
-              <a:t>10/8/19</a:t>
+              <a:t>10/16/19</a:t>
             </a:fld>
             <a:endParaRPr lang="en-GB"/>
           </a:p>
@@ -2699,7 +2700,7 @@
           <a:p>
             <a:fld id="{EA0859CA-E562-0543-89DB-8DDD389045EB}" type="datetime1">
               <a:rPr lang="en-US" smtClean="0"/>
-              <a:t>10/8/19</a:t>
+              <a:t>10/16/19</a:t>
             </a:fld>
             <a:endParaRPr lang="en-GB"/>
           </a:p>
@@ -2821,7 +2822,7 @@
           <a:p>
             <a:fld id="{24097114-E828-4749-869B-BC65CE04BE9C}" type="datetime1">
               <a:rPr lang="en-US" smtClean="0"/>
-              <a:t>10/8/19</a:t>
+              <a:t>10/16/19</a:t>
             </a:fld>
             <a:endParaRPr lang="en-GB"/>
           </a:p>
@@ -2920,7 +2921,7 @@
           <a:p>
             <a:fld id="{2A5AE7AB-F29E-264B-B651-49FF9909AD16}" type="datetime1">
               <a:rPr lang="en-US" smtClean="0"/>
-              <a:t>10/8/19</a:t>
+              <a:t>10/16/19</a:t>
             </a:fld>
             <a:endParaRPr lang="en-GB"/>
           </a:p>
@@ -3201,7 +3202,7 @@
           <a:p>
             <a:fld id="{8C9CFF24-BD28-7A44-B5CD-96AC8BAD0734}" type="datetime1">
               <a:rPr lang="en-US" smtClean="0"/>
-              <a:t>10/8/19</a:t>
+              <a:t>10/16/19</a:t>
             </a:fld>
             <a:endParaRPr lang="en-GB"/>
           </a:p>
@@ -3357,7 +3358,7 @@
           <a:p>
             <a:fld id="{3FEAAED1-952F-EE4B-8D7A-D535110793A6}" type="datetime1">
               <a:rPr lang="en-US" smtClean="0"/>
-              <a:t>10/8/19</a:t>
+              <a:t>10/16/19</a:t>
             </a:fld>
             <a:endParaRPr lang="en-US" dirty="0"/>
           </a:p>
@@ -3638,7 +3639,7 @@
           <a:p>
             <a:fld id="{BB82DA57-F0A9-C841-85D1-559AACFAB31E}" type="datetime1">
               <a:rPr lang="en-US" smtClean="0"/>
-              <a:t>10/8/19</a:t>
+              <a:t>10/16/19</a:t>
             </a:fld>
             <a:endParaRPr lang="en-GB"/>
           </a:p>
@@ -3812,7 +3813,7 @@
           <a:p>
             <a:fld id="{CEA31EE3-FAB5-6448-80A9-5EDF46C29388}" type="datetime1">
               <a:rPr lang="en-US" smtClean="0"/>
-              <a:t>10/8/19</a:t>
+              <a:t>10/16/19</a:t>
             </a:fld>
             <a:endParaRPr lang="en-GB"/>
           </a:p>
@@ -3996,7 +3997,7 @@
           <a:p>
             <a:fld id="{4D9561CA-823C-9342-9B66-E1C02631E96C}" type="datetime1">
               <a:rPr lang="en-US" smtClean="0"/>
-              <a:t>10/8/19</a:t>
+              <a:t>10/16/19</a:t>
             </a:fld>
             <a:endParaRPr lang="en-GB"/>
           </a:p>
@@ -4343,7 +4344,7 @@
           <a:p>
             <a:fld id="{B2D101BA-12C2-9649-9D04-5BB1B1DED96A}" type="datetime1">
               <a:rPr lang="en-US" smtClean="0"/>
-              <a:t>10/8/19</a:t>
+              <a:t>10/16/19</a:t>
             </a:fld>
             <a:endParaRPr lang="en-US" dirty="0"/>
           </a:p>
@@ -4617,7 +4618,7 @@
           <a:p>
             <a:fld id="{E27B3BAB-8015-DE46-B741-DC198C16A98F}" type="datetime1">
               <a:rPr lang="en-US" smtClean="0"/>
-              <a:t>10/8/19</a:t>
+              <a:t>10/16/19</a:t>
             </a:fld>
             <a:endParaRPr lang="en-US" dirty="0"/>
           </a:p>
@@ -4995,7 +4996,7 @@
           <a:p>
             <a:fld id="{C600B27B-E9FE-764F-BB11-D76572EC2D90}" type="datetime1">
               <a:rPr lang="en-US" smtClean="0"/>
-              <a:t>10/8/19</a:t>
+              <a:t>10/16/19</a:t>
             </a:fld>
             <a:endParaRPr lang="en-US" dirty="0"/>
           </a:p>
@@ -5112,7 +5113,7 @@
           <a:p>
             <a:fld id="{6BEAC06D-B3B1-7948-9D74-30CBA7BB199E}" type="datetime1">
               <a:rPr lang="en-US" smtClean="0"/>
-              <a:t>10/8/19</a:t>
+              <a:t>10/16/19</a:t>
             </a:fld>
             <a:endParaRPr lang="en-US" dirty="0"/>
           </a:p>
@@ -5282,7 +5283,7 @@
           <a:p>
             <a:fld id="{1EAA9229-64B9-F148-AABF-F06FCD98D802}" type="datetime1">
               <a:rPr lang="en-US" smtClean="0"/>
-              <a:t>10/8/19</a:t>
+              <a:t>10/16/19</a:t>
             </a:fld>
             <a:endParaRPr lang="en-US" dirty="0"/>
           </a:p>
@@ -5665,7 +5666,7 @@
           <a:p>
             <a:fld id="{F36AB87E-6E0F-704A-AD74-2F3A10DD5725}" type="datetime1">
               <a:rPr lang="en-US" smtClean="0"/>
-              <a:t>10/8/19</a:t>
+              <a:t>10/16/19</a:t>
             </a:fld>
             <a:endParaRPr lang="en-US" dirty="0"/>
           </a:p>
@@ -6047,7 +6048,7 @@
           <a:p>
             <a:fld id="{557DCDE8-4FE3-F84A-982F-71B2705EE539}" type="datetime1">
               <a:rPr lang="en-US" smtClean="0"/>
-              <a:t>10/8/19</a:t>
+              <a:t>10/16/19</a:t>
             </a:fld>
             <a:endParaRPr lang="en-US" dirty="0"/>
           </a:p>
@@ -6332,7 +6333,7 @@
           <a:p>
             <a:fld id="{EFC969E6-493D-8C48-BE1B-CEFFA93DB2D1}" type="datetime1">
               <a:rPr lang="en-US" smtClean="0"/>
-              <a:t>10/8/19</a:t>
+              <a:t>10/16/19</a:t>
             </a:fld>
             <a:endParaRPr lang="en-US" dirty="0"/>
           </a:p>
@@ -7022,7 +7023,7 @@
           <a:p>
             <a:fld id="{B773F978-7B88-DE41-B2A4-A4CB753F97DE}" type="datetime1">
               <a:rPr lang="en-US" smtClean="0"/>
-              <a:t>10/8/19</a:t>
+              <a:t>10/16/19</a:t>
             </a:fld>
             <a:endParaRPr lang="en-GB"/>
           </a:p>
@@ -7571,8 +7572,16 @@
           <a:p>
             <a:pPr algn="ctr"/>
             <a:r>
+              <a:rPr lang="en-US" u="sng" dirty="0"/>
+              <a:t>G. </a:t>
+            </a:r>
+            <a:r>
+              <a:rPr lang="en-US" u="sng" dirty="0" err="1"/>
+              <a:t>Bakas</a:t>
+            </a:r>
+            <a:r>
               <a:rPr lang="en-US" dirty="0"/>
-              <a:t>K. </a:t>
+              <a:t>, K. </a:t>
             </a:r>
             <a:r>
               <a:rPr lang="en-US" dirty="0" err="1"/>
@@ -7580,36 +7589,21 @@
             </a:r>
             <a:r>
               <a:rPr lang="en-US" dirty="0"/>
+              <a:t>, I. </a:t>
+            </a:r>
+            <a:r>
+              <a:rPr lang="en-US" dirty="0" err="1"/>
+              <a:t>Papakrivopoulos</a:t>
+            </a:r>
+            <a:r>
+              <a:rPr lang="en-US" dirty="0"/>
               <a:t>, G. </a:t>
             </a:r>
             <a:r>
               <a:rPr lang="en-US" dirty="0" err="1"/>
               <a:t>Tsipolitis</a:t>
             </a:r>
-            <a:r>
-              <a:rPr lang="en-US" dirty="0"/>
-              <a:t>, </a:t>
-            </a:r>
-            <a:r>
-              <a:rPr lang="en-US" u="sng" dirty="0"/>
-              <a:t>G. </a:t>
-            </a:r>
-            <a:r>
-              <a:rPr lang="en-US" u="sng" dirty="0" err="1"/>
-              <a:t>Bakas</a:t>
-            </a:r>
-            <a:r>
-              <a:rPr lang="en-US" dirty="0"/>
-              <a:t>, I. </a:t>
-            </a:r>
-            <a:r>
-              <a:rPr lang="en-US" dirty="0" err="1"/>
-              <a:t>Papakrivopoulos</a:t>
-            </a:r>
-            <a:r>
-              <a:rPr lang="en-US" dirty="0"/>
-              <a:t> </a:t>
-            </a:r>
+            <a:endParaRPr lang="en-US" dirty="0"/>
           </a:p>
         </p:txBody>
       </p:sp>
@@ -7690,7 +7684,473 @@
           <a:p>
             <a:r>
               <a:rPr lang="en-US" sz="2800" u="sng" dirty="0"/>
-              <a:t>Status</a:t>
+              <a:t>Status 2016 Analysis</a:t>
+            </a:r>
+          </a:p>
+          <a:p>
+            <a:endParaRPr lang="en-US" sz="2800" u="sng" dirty="0"/>
+          </a:p>
+        </p:txBody>
+      </p:sp>
+      <p:sp>
+        <p:nvSpPr>
+          <p:cNvPr id="2" name="TextBox 1">
+            <a:extLst>
+              <a:ext uri="{FF2B5EF4-FFF2-40B4-BE49-F238E27FC236}">
+                <a16:creationId xmlns:a16="http://schemas.microsoft.com/office/drawing/2014/main" id="{F7724272-DF9E-9B47-A3AB-AE0DAAD2F54A}"/>
+              </a:ext>
+            </a:extLst>
+          </p:cNvPr>
+          <p:cNvSpPr txBox="1"/>
+          <p:nvPr/>
+        </p:nvSpPr>
+        <p:spPr>
+          <a:xfrm>
+            <a:off x="24094" y="618442"/>
+            <a:ext cx="9663545" cy="2308324"/>
+          </a:xfrm>
+          <a:prstGeom prst="rect">
+            <a:avLst/>
+          </a:prstGeom>
+          <a:noFill/>
+        </p:spPr>
+        <p:txBody>
+          <a:bodyPr wrap="square" rtlCol="0">
+            <a:spAutoFit/>
+          </a:bodyPr>
+          <a:lstStyle/>
+          <a:p>
+            <a:pPr marL="285750" indent="-285750">
+              <a:buFont typeface="Arial" panose="020B0604020202020204" pitchFamily="34" charset="0"/>
+              <a:buChar char="•"/>
+            </a:pPr>
+            <a:r>
+              <a:rPr lang="en-US" dirty="0"/>
+              <a:t>ttbar differential cross sections in boosted </a:t>
+            </a:r>
+            <a:r>
+              <a:rPr lang="en-US" dirty="0" err="1"/>
+              <a:t>l+jets</a:t>
+            </a:r>
+            <a:r>
+              <a:rPr lang="en-US" dirty="0"/>
+              <a:t> and all-hadronic channel (2016)</a:t>
+            </a:r>
+          </a:p>
+          <a:p>
+            <a:pPr marL="742950" lvl="1" indent="-285750">
+              <a:buFont typeface="Arial" panose="020B0604020202020204" pitchFamily="34" charset="0"/>
+              <a:buChar char="•"/>
+            </a:pPr>
+            <a:r>
+              <a:rPr lang="en-US" dirty="0"/>
+              <a:t>TOP-18-013 and AN-2017/149</a:t>
+            </a:r>
+          </a:p>
+          <a:p>
+            <a:pPr marL="742950" lvl="1" indent="-285750">
+              <a:buFont typeface="Arial" panose="020B0604020202020204" pitchFamily="34" charset="0"/>
+              <a:buChar char="•"/>
+            </a:pPr>
+            <a:r>
+              <a:rPr lang="en-US" dirty="0"/>
+              <a:t>ARC authors meeting: decided that two investigated variables should change</a:t>
+            </a:r>
+          </a:p>
+          <a:p>
+            <a:pPr marL="1200150" lvl="2" indent="-285750">
+              <a:buFont typeface="Arial" panose="020B0604020202020204" pitchFamily="34" charset="0"/>
+              <a:buChar char="•"/>
+            </a:pPr>
+            <a:r>
+              <a:rPr lang="en-US" dirty="0">
+                <a:solidFill>
+                  <a:srgbClr val="FF0000"/>
+                </a:solidFill>
+              </a:rPr>
+              <a:t>No inclusive jet P</a:t>
+            </a:r>
+            <a:r>
+              <a:rPr lang="en-US" baseline="-25000" dirty="0">
+                <a:solidFill>
+                  <a:srgbClr val="FF0000"/>
+                </a:solidFill>
+              </a:rPr>
+              <a:t>T </a:t>
+            </a:r>
+            <a:r>
+              <a:rPr lang="en-US" dirty="0">
+                <a:solidFill>
+                  <a:srgbClr val="FF0000"/>
+                </a:solidFill>
+              </a:rPr>
+              <a:t> and jet Eta</a:t>
+            </a:r>
+          </a:p>
+          <a:p>
+            <a:pPr marL="1200150" lvl="2" indent="-285750">
+              <a:buFont typeface="Arial" panose="020B0604020202020204" pitchFamily="34" charset="0"/>
+              <a:buChar char="•"/>
+            </a:pPr>
+            <a:r>
+              <a:rPr lang="en-US" dirty="0"/>
+              <a:t>Now: leading jet P</a:t>
+            </a:r>
+            <a:r>
+              <a:rPr lang="en-US" baseline="-25000" dirty="0"/>
+              <a:t>T </a:t>
+            </a:r>
+            <a:r>
+              <a:rPr lang="en-US" dirty="0"/>
+              <a:t>and absolute value of leading jet rapidity</a:t>
+            </a:r>
+          </a:p>
+          <a:p>
+            <a:pPr marL="1200150" lvl="2" indent="-285750">
+              <a:buFont typeface="Arial" panose="020B0604020202020204" pitchFamily="34" charset="0"/>
+              <a:buChar char="•"/>
+            </a:pPr>
+            <a:r>
+              <a:rPr lang="en-US" dirty="0"/>
+              <a:t>Sub-leading jet P</a:t>
+            </a:r>
+            <a:r>
+              <a:rPr lang="en-US" baseline="-25000" dirty="0"/>
+              <a:t>T </a:t>
+            </a:r>
+            <a:r>
+              <a:rPr lang="en-US" dirty="0"/>
+              <a:t> and absolute value of sub-leading jet rapidity </a:t>
+            </a:r>
+          </a:p>
+          <a:p>
+            <a:pPr marL="1200150" lvl="2" indent="-285750">
+              <a:buFont typeface="Arial" panose="020B0604020202020204" pitchFamily="34" charset="0"/>
+              <a:buChar char="•"/>
+            </a:pPr>
+            <a:r>
+              <a:rPr lang="en-US" dirty="0"/>
+              <a:t>Consistent with the semi-leptonic analysis </a:t>
+            </a:r>
+          </a:p>
+          <a:p>
+            <a:pPr marL="1200150" lvl="2" indent="-285750">
+              <a:buFont typeface="Arial" panose="020B0604020202020204" pitchFamily="34" charset="0"/>
+              <a:buChar char="•"/>
+            </a:pPr>
+            <a:r>
+              <a:rPr lang="en-US" dirty="0"/>
+              <a:t>Changes have been already implemented there are new versions both for AN and paper</a:t>
+            </a:r>
+          </a:p>
+        </p:txBody>
+      </p:sp>
+      <p:pic>
+        <p:nvPicPr>
+          <p:cNvPr id="4" name="Picture 3">
+            <a:extLst>
+              <a:ext uri="{FF2B5EF4-FFF2-40B4-BE49-F238E27FC236}">
+                <a16:creationId xmlns:a16="http://schemas.microsoft.com/office/drawing/2014/main" id="{BA3ED607-8A94-DB44-A43B-6436C924CE70}"/>
+              </a:ext>
+            </a:extLst>
+          </p:cNvPr>
+          <p:cNvPicPr>
+            <a:picLocks noChangeAspect="1"/>
+          </p:cNvPicPr>
+          <p:nvPr/>
+        </p:nvPicPr>
+        <p:blipFill>
+          <a:blip r:embed="rId2"/>
+          <a:stretch>
+            <a:fillRect/>
+          </a:stretch>
+        </p:blipFill>
+        <p:spPr>
+          <a:xfrm>
+            <a:off x="277096" y="3066860"/>
+            <a:ext cx="3784023" cy="3172698"/>
+          </a:xfrm>
+          <a:prstGeom prst="rect">
+            <a:avLst/>
+          </a:prstGeom>
+        </p:spPr>
+      </p:pic>
+      <p:pic>
+        <p:nvPicPr>
+          <p:cNvPr id="5" name="Picture 4">
+            <a:extLst>
+              <a:ext uri="{FF2B5EF4-FFF2-40B4-BE49-F238E27FC236}">
+                <a16:creationId xmlns:a16="http://schemas.microsoft.com/office/drawing/2014/main" id="{AC0D9D5B-DBEC-2B41-8B2B-09649C07134A}"/>
+              </a:ext>
+            </a:extLst>
+          </p:cNvPr>
+          <p:cNvPicPr>
+            <a:picLocks noChangeAspect="1"/>
+          </p:cNvPicPr>
+          <p:nvPr/>
+        </p:nvPicPr>
+        <p:blipFill>
+          <a:blip r:embed="rId3"/>
+          <a:stretch>
+            <a:fillRect/>
+          </a:stretch>
+        </p:blipFill>
+        <p:spPr>
+          <a:xfrm>
+            <a:off x="4188144" y="3066859"/>
+            <a:ext cx="3784023" cy="3172699"/>
+          </a:xfrm>
+          <a:prstGeom prst="rect">
+            <a:avLst/>
+          </a:prstGeom>
+        </p:spPr>
+      </p:pic>
+      <p:pic>
+        <p:nvPicPr>
+          <p:cNvPr id="6" name="Picture 5">
+            <a:extLst>
+              <a:ext uri="{FF2B5EF4-FFF2-40B4-BE49-F238E27FC236}">
+                <a16:creationId xmlns:a16="http://schemas.microsoft.com/office/drawing/2014/main" id="{8F178696-009F-6544-BBAD-64C79A50CFF3}"/>
+              </a:ext>
+            </a:extLst>
+          </p:cNvPr>
+          <p:cNvPicPr>
+            <a:picLocks noChangeAspect="1"/>
+          </p:cNvPicPr>
+          <p:nvPr/>
+        </p:nvPicPr>
+        <p:blipFill>
+          <a:blip r:embed="rId4"/>
+          <a:stretch>
+            <a:fillRect/>
+          </a:stretch>
+        </p:blipFill>
+        <p:spPr>
+          <a:xfrm>
+            <a:off x="8114132" y="3066859"/>
+            <a:ext cx="3784024" cy="3172699"/>
+          </a:xfrm>
+          <a:prstGeom prst="rect">
+            <a:avLst/>
+          </a:prstGeom>
+        </p:spPr>
+      </p:pic>
+      <p:pic>
+        <p:nvPicPr>
+          <p:cNvPr id="8" name="Picture 7">
+            <a:extLst>
+              <a:ext uri="{FF2B5EF4-FFF2-40B4-BE49-F238E27FC236}">
+                <a16:creationId xmlns:a16="http://schemas.microsoft.com/office/drawing/2014/main" id="{6D6165EE-BD87-A64A-B8C2-209B57721548}"/>
+              </a:ext>
+            </a:extLst>
+          </p:cNvPr>
+          <p:cNvPicPr>
+            <a:picLocks noChangeAspect="1"/>
+          </p:cNvPicPr>
+          <p:nvPr/>
+        </p:nvPicPr>
+        <p:blipFill>
+          <a:blip r:embed="rId5"/>
+          <a:stretch>
+            <a:fillRect/>
+          </a:stretch>
+        </p:blipFill>
+        <p:spPr>
+          <a:xfrm>
+            <a:off x="10722814" y="156901"/>
+            <a:ext cx="1357221" cy="1762362"/>
+          </a:xfrm>
+          <a:prstGeom prst="rect">
+            <a:avLst/>
+          </a:prstGeom>
+        </p:spPr>
+      </p:pic>
+      <p:sp>
+        <p:nvSpPr>
+          <p:cNvPr id="9" name="TextBox 8">
+            <a:extLst>
+              <a:ext uri="{FF2B5EF4-FFF2-40B4-BE49-F238E27FC236}">
+                <a16:creationId xmlns:a16="http://schemas.microsoft.com/office/drawing/2014/main" id="{8A60F31B-C247-D344-87C2-D3F0B914D5DA}"/>
+              </a:ext>
+            </a:extLst>
+          </p:cNvPr>
+          <p:cNvSpPr txBox="1"/>
+          <p:nvPr/>
+        </p:nvSpPr>
+        <p:spPr>
+          <a:xfrm>
+            <a:off x="10780556" y="1992189"/>
+            <a:ext cx="1241736" cy="307777"/>
+          </a:xfrm>
+          <a:prstGeom prst="rect">
+            <a:avLst/>
+          </a:prstGeom>
+          <a:noFill/>
+        </p:spPr>
+        <p:txBody>
+          <a:bodyPr wrap="square" rtlCol="0">
+            <a:spAutoFit/>
+          </a:bodyPr>
+          <a:lstStyle/>
+          <a:p>
+            <a:r>
+              <a:rPr lang="en-US" sz="1400" dirty="0"/>
+              <a:t>AN-2017/149</a:t>
+            </a:r>
+          </a:p>
+        </p:txBody>
+      </p:sp>
+      <p:pic>
+        <p:nvPicPr>
+          <p:cNvPr id="10" name="Picture 9">
+            <a:extLst>
+              <a:ext uri="{FF2B5EF4-FFF2-40B4-BE49-F238E27FC236}">
+                <a16:creationId xmlns:a16="http://schemas.microsoft.com/office/drawing/2014/main" id="{66E57EB6-8454-F84D-896F-1C775B220CE8}"/>
+              </a:ext>
+            </a:extLst>
+          </p:cNvPr>
+          <p:cNvPicPr>
+            <a:picLocks noChangeAspect="1"/>
+          </p:cNvPicPr>
+          <p:nvPr/>
+        </p:nvPicPr>
+        <p:blipFill>
+          <a:blip r:embed="rId6"/>
+          <a:stretch>
+            <a:fillRect/>
+          </a:stretch>
+        </p:blipFill>
+        <p:spPr>
+          <a:xfrm>
+            <a:off x="9180572" y="156901"/>
+            <a:ext cx="1357221" cy="1762362"/>
+          </a:xfrm>
+          <a:prstGeom prst="rect">
+            <a:avLst/>
+          </a:prstGeom>
+        </p:spPr>
+      </p:pic>
+      <p:sp>
+        <p:nvSpPr>
+          <p:cNvPr id="11" name="TextBox 10">
+            <a:extLst>
+              <a:ext uri="{FF2B5EF4-FFF2-40B4-BE49-F238E27FC236}">
+                <a16:creationId xmlns:a16="http://schemas.microsoft.com/office/drawing/2014/main" id="{9B827F2A-9B34-3C4C-915D-897AE1ABCACB}"/>
+              </a:ext>
+            </a:extLst>
+          </p:cNvPr>
+          <p:cNvSpPr txBox="1"/>
+          <p:nvPr/>
+        </p:nvSpPr>
+        <p:spPr>
+          <a:xfrm>
+            <a:off x="9340778" y="1992188"/>
+            <a:ext cx="1036807" cy="307777"/>
+          </a:xfrm>
+          <a:prstGeom prst="rect">
+            <a:avLst/>
+          </a:prstGeom>
+          <a:noFill/>
+        </p:spPr>
+        <p:txBody>
+          <a:bodyPr wrap="square" rtlCol="0">
+            <a:spAutoFit/>
+          </a:bodyPr>
+          <a:lstStyle/>
+          <a:p>
+            <a:r>
+              <a:rPr lang="en-US" sz="1400" dirty="0"/>
+              <a:t>TOP-18-013</a:t>
+            </a:r>
+          </a:p>
+        </p:txBody>
+      </p:sp>
+    </p:spTree>
+    <p:extLst>
+      <p:ext uri="{BB962C8B-B14F-4D97-AF65-F5344CB8AC3E}">
+        <p14:creationId xmlns:p14="http://schemas.microsoft.com/office/powerpoint/2010/main" val="2079852111"/>
+      </p:ext>
+    </p:extLst>
+  </p:cSld>
+  <p:clrMapOvr>
+    <a:masterClrMapping/>
+  </p:clrMapOvr>
+</p:sld>
+</file>
+
+<file path=ppt/slides/slide3.xml><?xml version="1.0" encoding="utf-8"?>
+<p:sld xmlns:a="http://schemas.openxmlformats.org/drawingml/2006/main" xmlns:r="http://schemas.openxmlformats.org/officeDocument/2006/relationships" xmlns:p="http://schemas.openxmlformats.org/presentationml/2006/main">
+  <p:cSld>
+    <p:spTree>
+      <p:nvGrpSpPr>
+        <p:cNvPr id="1" name=""/>
+        <p:cNvGrpSpPr/>
+        <p:nvPr/>
+      </p:nvGrpSpPr>
+      <p:grpSpPr>
+        <a:xfrm>
+          <a:off x="0" y="0"/>
+          <a:ext cx="0" cy="0"/>
+          <a:chOff x="0" y="0"/>
+          <a:chExt cx="0" cy="0"/>
+        </a:xfrm>
+      </p:grpSpPr>
+      <p:sp>
+        <p:nvSpPr>
+          <p:cNvPr id="3" name="Footer Placeholder 2"/>
+          <p:cNvSpPr>
+            <a:spLocks noGrp="1"/>
+          </p:cNvSpPr>
+          <p:nvPr>
+            <p:ph type="ftr" sz="quarter" idx="11"/>
+          </p:nvPr>
+        </p:nvSpPr>
+        <p:spPr/>
+        <p:txBody>
+          <a:bodyPr/>
+          <a:lstStyle/>
+          <a:p>
+            <a:r>
+              <a:rPr lang="fi-FI" dirty="0"/>
+              <a:t>NTUA</a:t>
+            </a:r>
+            <a:endParaRPr lang="en-US" dirty="0"/>
+          </a:p>
+        </p:txBody>
+      </p:sp>
+      <p:sp>
+        <p:nvSpPr>
+          <p:cNvPr id="7" name="TextBox 6"/>
+          <p:cNvSpPr txBox="1"/>
+          <p:nvPr/>
+        </p:nvSpPr>
+        <p:spPr>
+          <a:xfrm>
+            <a:off x="111965" y="83975"/>
+            <a:ext cx="11783049" cy="954107"/>
+          </a:xfrm>
+          <a:prstGeom prst="rect">
+            <a:avLst/>
+          </a:prstGeom>
+          <a:noFill/>
+        </p:spPr>
+        <p:txBody>
+          <a:bodyPr wrap="square" rtlCol="0">
+            <a:spAutoFit/>
+          </a:bodyPr>
+          <a:lstStyle/>
+          <a:p>
+            <a:r>
+              <a:rPr lang="en-US" sz="2800" u="sng" dirty="0"/>
+              <a:t>Status full </a:t>
+            </a:r>
+            <a:r>
+              <a:rPr lang="en-US" sz="2800" u="sng" dirty="0" err="1"/>
+              <a:t>RunII</a:t>
+            </a:r>
+            <a:r>
+              <a:rPr lang="en-US" sz="2800" u="sng" dirty="0"/>
+              <a:t> Data</a:t>
             </a:r>
           </a:p>
           <a:p>
@@ -7714,8 +8174,8 @@
             </p:nvSpPr>
             <p:spPr>
               <a:xfrm>
-                <a:off x="238991" y="758536"/>
-                <a:ext cx="11824854" cy="5651547"/>
+                <a:off x="296986" y="353291"/>
+                <a:ext cx="11824854" cy="6205545"/>
               </a:xfrm>
               <a:prstGeom prst="rect">
                 <a:avLst/>
@@ -7728,128 +8188,8 @@
               </a:bodyPr>
               <a:lstStyle/>
               <a:p>
-                <a:pPr marL="285750" indent="-285750">
-                  <a:buFont typeface="Arial" panose="020B0604020202020204" pitchFamily="34" charset="0"/>
-                  <a:buChar char="•"/>
-                </a:pPr>
-                <a:r>
-                  <a:rPr lang="en-US" dirty="0"/>
-                  <a:t>ttbar differential cross sections in boosted </a:t>
-                </a:r>
-                <a:r>
-                  <a:rPr lang="en-US" dirty="0" err="1"/>
-                  <a:t>l+jets</a:t>
-                </a:r>
-                <a:r>
-                  <a:rPr lang="en-US" dirty="0"/>
-                  <a:t> and all-hadronic channel (2016)</a:t>
-                </a:r>
-              </a:p>
-              <a:p>
-                <a:pPr marL="742950" lvl="1" indent="-285750">
-                  <a:buFont typeface="Arial" panose="020B0604020202020204" pitchFamily="34" charset="0"/>
-                  <a:buChar char="•"/>
-                </a:pPr>
-                <a:r>
-                  <a:rPr lang="en-US" dirty="0"/>
-                  <a:t>TOP-18-013 and AN-2017/149</a:t>
-                </a:r>
-              </a:p>
-              <a:p>
-                <a:pPr marL="742950" lvl="1" indent="-285750">
-                  <a:buFont typeface="Arial" panose="020B0604020202020204" pitchFamily="34" charset="0"/>
-                  <a:buChar char="•"/>
-                </a:pPr>
-                <a:r>
-                  <a:rPr lang="en-US" dirty="0"/>
-                  <a:t>ARC authors meeting: decided that two variables that we are investigating should change</a:t>
-                </a:r>
-              </a:p>
-              <a:p>
-                <a:pPr marL="1200150" lvl="2" indent="-285750">
-                  <a:buFont typeface="Arial" panose="020B0604020202020204" pitchFamily="34" charset="0"/>
-                  <a:buChar char="•"/>
-                </a:pPr>
-                <a:r>
-                  <a:rPr lang="en-US" dirty="0">
-                    <a:solidFill>
-                      <a:srgbClr val="FF0000"/>
-                    </a:solidFill>
-                  </a:rPr>
-                  <a:t>No inclusive jet P</a:t>
-                </a:r>
-                <a:r>
-                  <a:rPr lang="en-US" baseline="-25000" dirty="0">
-                    <a:solidFill>
-                      <a:srgbClr val="FF0000"/>
-                    </a:solidFill>
-                  </a:rPr>
-                  <a:t>T </a:t>
-                </a:r>
-                <a:r>
-                  <a:rPr lang="en-US" dirty="0">
-                    <a:solidFill>
-                      <a:srgbClr val="FF0000"/>
-                    </a:solidFill>
-                  </a:rPr>
-                  <a:t> and jet Eta</a:t>
-                </a:r>
-              </a:p>
-              <a:p>
-                <a:pPr marL="1200150" lvl="2" indent="-285750">
-                  <a:buFont typeface="Arial" panose="020B0604020202020204" pitchFamily="34" charset="0"/>
-                  <a:buChar char="•"/>
-                </a:pPr>
-                <a:r>
-                  <a:rPr lang="en-US" dirty="0"/>
-                  <a:t>Now: leading jet P</a:t>
-                </a:r>
-                <a:r>
-                  <a:rPr lang="en-US" baseline="-25000" dirty="0"/>
-                  <a:t>T </a:t>
-                </a:r>
-                <a:r>
-                  <a:rPr lang="en-US" dirty="0"/>
-                  <a:t>and absolute value of leading jet rapidity</a:t>
-                </a:r>
-              </a:p>
-              <a:p>
-                <a:pPr marL="1200150" lvl="2" indent="-285750">
-                  <a:buFont typeface="Arial" panose="020B0604020202020204" pitchFamily="34" charset="0"/>
-                  <a:buChar char="•"/>
-                </a:pPr>
-                <a:r>
-                  <a:rPr lang="en-US" dirty="0"/>
-                  <a:t>Sub-leading jet P</a:t>
-                </a:r>
-                <a:r>
-                  <a:rPr lang="en-US" baseline="-25000" dirty="0"/>
-                  <a:t>T </a:t>
-                </a:r>
-                <a:r>
-                  <a:rPr lang="en-US" dirty="0"/>
-                  <a:t> and absolute value of sub-leading jet rapidity </a:t>
-                </a:r>
-              </a:p>
-              <a:p>
-                <a:pPr marL="1200150" lvl="2" indent="-285750">
-                  <a:buFont typeface="Arial" panose="020B0604020202020204" pitchFamily="34" charset="0"/>
-                  <a:buChar char="•"/>
-                </a:pPr>
-                <a:r>
-                  <a:rPr lang="en-US" dirty="0"/>
-                  <a:t>Consistent with the semi-leptonic analysis </a:t>
-                </a:r>
-              </a:p>
-              <a:p>
-                <a:pPr marL="1200150" lvl="2" indent="-285750">
-                  <a:buFont typeface="Arial" panose="020B0604020202020204" pitchFamily="34" charset="0"/>
-                  <a:buChar char="•"/>
-                </a:pPr>
-                <a:r>
-                  <a:rPr lang="en-US" dirty="0"/>
-                  <a:t>Changes have been already implemented there are new versions both for AN and paper</a:t>
-                </a:r>
+                <a:pPr lvl="1"/>
+                <a:endParaRPr lang="en-US" dirty="0"/>
               </a:p>
               <a:p>
                 <a:pPr marL="285750" indent="-285750">
@@ -7883,7 +8223,7 @@
                 </a:r>
                 <a:r>
                   <a:rPr lang="en-US" dirty="0"/>
-                  <a:t>&gt; 400) </a:t>
+                  <a:t>&gt; 400 GeV) </a:t>
                 </a:r>
               </a:p>
               <a:p>
@@ -7910,7 +8250,7 @@
                 </a:pPr>
                 <a:r>
                   <a:rPr lang="en-US" dirty="0"/>
-                  <a:t>Fiducial , Particle and Parton phase space</a:t>
+                  <a:t>Fiducial and then unfolded to Particle and Parton phase space</a:t>
                 </a:r>
               </a:p>
               <a:p>
@@ -7975,7 +8315,7 @@
                 </a:pPr>
                 <a:r>
                   <a:rPr lang="en-US" dirty="0"/>
-                  <a:t>cos(</a:t>
+                  <a:t>|cos(</a:t>
                 </a:r>
                 <a:r>
                   <a:rPr lang="el-GR" dirty="0"/>
@@ -7983,7 +8323,7 @@
                 </a:r>
                 <a:r>
                   <a:rPr lang="en-US" dirty="0"/>
-                  <a:t>: where scattering angle </a:t>
+                  <a:t>|: where scattering angle </a:t>
                 </a:r>
                 <a:r>
                   <a:rPr lang="el-GR" dirty="0"/>
@@ -8202,11 +8542,99 @@
                 </a:r>
               </a:p>
               <a:p>
-                <a:pPr marL="1200150" lvl="2" indent="-285750">
+                <a:pPr marL="285750" indent="-285750">
                   <a:buFont typeface="Arial" panose="020B0604020202020204" pitchFamily="34" charset="0"/>
                   <a:buChar char="•"/>
                 </a:pPr>
                 <a:endParaRPr lang="en-US" dirty="0"/>
+              </a:p>
+              <a:p>
+                <a:pPr marL="285750" indent="-285750">
+                  <a:buFont typeface="Arial" panose="020B0604020202020204" pitchFamily="34" charset="0"/>
+                  <a:buChar char="•"/>
+                </a:pPr>
+                <a:r>
+                  <a:rPr lang="en-US" dirty="0"/>
+                  <a:t>Looking into:</a:t>
+                </a:r>
+              </a:p>
+              <a:p>
+                <a:pPr marL="742950" lvl="1" indent="-285750">
+                  <a:buFont typeface="Arial" panose="020B0604020202020204" pitchFamily="34" charset="0"/>
+                  <a:buChar char="•"/>
+                </a:pPr>
+                <a:r>
+                  <a:rPr lang="en-US" dirty="0"/>
+                  <a:t>2016: 9_4_XX re-</a:t>
+                </a:r>
+                <a:r>
+                  <a:rPr lang="en-US" dirty="0" err="1"/>
+                  <a:t>reco</a:t>
+                </a:r>
+                <a:endParaRPr lang="en-US" dirty="0"/>
+              </a:p>
+              <a:p>
+                <a:pPr marL="742950" lvl="1" indent="-285750">
+                  <a:buFont typeface="Arial" panose="020B0604020202020204" pitchFamily="34" charset="0"/>
+                  <a:buChar char="•"/>
+                </a:pPr>
+                <a:r>
+                  <a:rPr lang="en-US" dirty="0"/>
+                  <a:t>2017: 9_4_XX</a:t>
+                </a:r>
+              </a:p>
+              <a:p>
+                <a:pPr marL="742950" lvl="1" indent="-285750">
+                  <a:buFont typeface="Arial" panose="020B0604020202020204" pitchFamily="34" charset="0"/>
+                  <a:buChar char="•"/>
+                </a:pPr>
+                <a:r>
+                  <a:rPr lang="en-US" dirty="0"/>
+                  <a:t>2018: 10_2_XX</a:t>
+                </a:r>
+              </a:p>
+              <a:p>
+                <a:pPr marL="742950" lvl="1" indent="-285750">
+                  <a:buFont typeface="Arial" panose="020B0604020202020204" pitchFamily="34" charset="0"/>
+                  <a:buChar char="•"/>
+                </a:pPr>
+                <a:r>
+                  <a:rPr lang="en-US" dirty="0"/>
+                  <a:t>2016 and 2017 and 2018 data	</a:t>
+                </a:r>
+              </a:p>
+              <a:p>
+                <a:pPr marL="742950" lvl="1" indent="-285750">
+                  <a:buFont typeface="Arial" panose="020B0604020202020204" pitchFamily="34" charset="0"/>
+                  <a:buChar char="•"/>
+                </a:pPr>
+                <a:r>
+                  <a:rPr lang="en-US" dirty="0"/>
+                  <a:t>We are using only the TT bar samples with the </a:t>
+                </a:r>
+                <a:r>
+                  <a:rPr lang="en-US" dirty="0" err="1"/>
+                  <a:t>Mtt</a:t>
+                </a:r>
+                <a:endParaRPr lang="en-US" dirty="0"/>
+              </a:p>
+              <a:p>
+                <a:pPr lvl="1"/>
+                <a:r>
+                  <a:rPr lang="en-US" dirty="0"/>
+                  <a:t> cut (both 700-1000GeV and 1000-Inf GeV samples)</a:t>
+                </a:r>
+              </a:p>
+              <a:p>
+                <a:endParaRPr lang="en-US" dirty="0"/>
+              </a:p>
+              <a:p>
+                <a:pPr lvl="1"/>
+                <a:endParaRPr lang="en-US" dirty="0">
+                  <a:solidFill>
+                    <a:srgbClr val="FF0000"/>
+                  </a:solidFill>
+                </a:endParaRPr>
               </a:p>
             </p:txBody>
           </p:sp>
@@ -8228,8 +8656,8 @@
             </p:nvSpPr>
             <p:spPr>
               <a:xfrm>
-                <a:off x="238991" y="758536"/>
-                <a:ext cx="11824854" cy="5651547"/>
+                <a:off x="296986" y="353291"/>
+                <a:ext cx="11824854" cy="6205545"/>
               </a:xfrm>
               <a:prstGeom prst="rect">
                 <a:avLst/>
@@ -8237,7 +8665,7 @@
               <a:blipFill>
                 <a:blip r:embed="rId2"/>
                 <a:stretch>
-                  <a:fillRect l="-322" t="-674"/>
+                  <a:fillRect l="-215"/>
                 </a:stretch>
               </a:blipFill>
             </p:spPr>
@@ -8256,97 +8684,42 @@
           </p:sp>
         </mc:Fallback>
       </mc:AlternateContent>
-    </p:spTree>
-    <p:extLst>
-      <p:ext uri="{BB962C8B-B14F-4D97-AF65-F5344CB8AC3E}">
-        <p14:creationId xmlns:p14="http://schemas.microsoft.com/office/powerpoint/2010/main" val="2079852111"/>
-      </p:ext>
-    </p:extLst>
-  </p:cSld>
-  <p:clrMapOvr>
-    <a:masterClrMapping/>
-  </p:clrMapOvr>
-</p:sld>
-</file>
-
-<file path=ppt/slides/slide3.xml><?xml version="1.0" encoding="utf-8"?>
-<p:sld xmlns:a="http://schemas.openxmlformats.org/drawingml/2006/main" xmlns:r="http://schemas.openxmlformats.org/officeDocument/2006/relationships" xmlns:p="http://schemas.openxmlformats.org/presentationml/2006/main">
-  <p:cSld>
-    <p:spTree>
-      <p:nvGrpSpPr>
-        <p:cNvPr id="1" name=""/>
-        <p:cNvGrpSpPr/>
-        <p:nvPr/>
-      </p:nvGrpSpPr>
-      <p:grpSpPr>
-        <a:xfrm>
-          <a:off x="0" y="0"/>
-          <a:ext cx="0" cy="0"/>
-          <a:chOff x="0" y="0"/>
-          <a:chExt cx="0" cy="0"/>
-        </a:xfrm>
-      </p:grpSpPr>
-      <p:sp>
-        <p:nvSpPr>
-          <p:cNvPr id="3" name="Footer Placeholder 2"/>
-          <p:cNvSpPr>
-            <a:spLocks noGrp="1"/>
-          </p:cNvSpPr>
-          <p:nvPr>
-            <p:ph type="ftr" sz="quarter" idx="11"/>
-          </p:nvPr>
-        </p:nvSpPr>
-        <p:spPr/>
-        <p:txBody>
-          <a:bodyPr/>
-          <a:lstStyle/>
-          <a:p>
-            <a:r>
-              <a:rPr lang="fi-FI"/>
-              <a:t>NTUA</a:t>
-            </a:r>
-            <a:endParaRPr lang="en-US" dirty="0"/>
-          </a:p>
-        </p:txBody>
-      </p:sp>
-      <p:sp>
-        <p:nvSpPr>
-          <p:cNvPr id="7" name="TextBox 6"/>
-          <p:cNvSpPr txBox="1"/>
+      <p:pic>
+        <p:nvPicPr>
+          <p:cNvPr id="11" name="Picture 10">
+            <a:extLst>
+              <a:ext uri="{FF2B5EF4-FFF2-40B4-BE49-F238E27FC236}">
+                <a16:creationId xmlns:a16="http://schemas.microsoft.com/office/drawing/2014/main" id="{54638569-4772-2646-9071-7CEA96B29ABE}"/>
+              </a:ext>
+            </a:extLst>
+          </p:cNvPr>
+          <p:cNvPicPr>
+            <a:picLocks noChangeAspect="1"/>
+          </p:cNvPicPr>
           <p:nvPr/>
-        </p:nvSpPr>
-        <p:spPr>
-          <a:xfrm>
-            <a:off x="111965" y="83975"/>
-            <a:ext cx="11783049" cy="954107"/>
+        </p:nvPicPr>
+        <p:blipFill>
+          <a:blip r:embed="rId3"/>
+          <a:stretch>
+            <a:fillRect/>
+          </a:stretch>
+        </p:blipFill>
+        <p:spPr>
+          <a:xfrm>
+            <a:off x="7678614" y="299164"/>
+            <a:ext cx="4216400" cy="2628900"/>
           </a:xfrm>
           <a:prstGeom prst="rect">
             <a:avLst/>
           </a:prstGeom>
-          <a:noFill/>
-        </p:spPr>
-        <p:txBody>
-          <a:bodyPr wrap="square" rtlCol="0">
-            <a:spAutoFit/>
-          </a:bodyPr>
-          <a:lstStyle/>
-          <a:p>
-            <a:r>
-              <a:rPr lang="en-US" sz="2800" u="sng" dirty="0"/>
-              <a:t>Status</a:t>
-            </a:r>
-          </a:p>
-          <a:p>
-            <a:endParaRPr lang="en-US" sz="2800" u="sng" dirty="0"/>
-          </a:p>
-        </p:txBody>
-      </p:sp>
-      <p:sp>
-        <p:nvSpPr>
-          <p:cNvPr id="2" name="TextBox 1">
+        </p:spPr>
+      </p:pic>
+      <p:sp>
+        <p:nvSpPr>
+          <p:cNvPr id="4" name="TextBox 3">
             <a:extLst>
               <a:ext uri="{FF2B5EF4-FFF2-40B4-BE49-F238E27FC236}">
-                <a16:creationId xmlns:a16="http://schemas.microsoft.com/office/drawing/2014/main" id="{F7724272-DF9E-9B47-A3AB-AE0DAAD2F54A}"/>
+                <a16:creationId xmlns:a16="http://schemas.microsoft.com/office/drawing/2014/main" id="{FCF44518-D145-AD46-BCE3-E7C7223B8550}"/>
               </a:ext>
             </a:extLst>
           </p:cNvPr>
@@ -8355,8 +8728,8 @@
         </p:nvSpPr>
         <p:spPr>
           <a:xfrm>
-            <a:off x="296986" y="353291"/>
-            <a:ext cx="11824854" cy="5909310"/>
+            <a:off x="5989494" y="5794599"/>
+            <a:ext cx="2934867" cy="276999"/>
           </a:xfrm>
           <a:prstGeom prst="rect">
             <a:avLst/>
@@ -8369,236 +8742,140 @@
           </a:bodyPr>
           <a:lstStyle/>
           <a:p>
-            <a:pPr lvl="1"/>
-            <a:endParaRPr lang="en-US" dirty="0"/>
-          </a:p>
-          <a:p>
-            <a:pPr marL="285750" indent="-285750">
-              <a:buFont typeface="Arial" panose="020B0604020202020204" pitchFamily="34" charset="0"/>
-              <a:buChar char="•"/>
-            </a:pPr>
-            <a:r>
-              <a:rPr lang="en-US" dirty="0"/>
-              <a:t>Looking into:</a:t>
-            </a:r>
-          </a:p>
-          <a:p>
-            <a:pPr marL="742950" lvl="1" indent="-285750">
-              <a:buFont typeface="Arial" panose="020B0604020202020204" pitchFamily="34" charset="0"/>
-              <a:buChar char="•"/>
-            </a:pPr>
-            <a:r>
-              <a:rPr lang="en-US" dirty="0"/>
-              <a:t>2016: 9_4_XX re-</a:t>
-            </a:r>
-            <a:r>
-              <a:rPr lang="en-US" dirty="0" err="1"/>
-              <a:t>reco</a:t>
-            </a:r>
-            <a:endParaRPr lang="en-US" dirty="0"/>
-          </a:p>
-          <a:p>
-            <a:pPr marL="742950" lvl="1" indent="-285750">
-              <a:buFont typeface="Arial" panose="020B0604020202020204" pitchFamily="34" charset="0"/>
-              <a:buChar char="•"/>
-            </a:pPr>
-            <a:r>
-              <a:rPr lang="en-US" dirty="0"/>
-              <a:t>2017: 9_4_XX</a:t>
-            </a:r>
-          </a:p>
-          <a:p>
-            <a:pPr marL="742950" lvl="1" indent="-285750">
-              <a:buFont typeface="Arial" panose="020B0604020202020204" pitchFamily="34" charset="0"/>
-              <a:buChar char="•"/>
-            </a:pPr>
-            <a:r>
-              <a:rPr lang="en-US" dirty="0"/>
-              <a:t>2018: 10_2_XX</a:t>
-            </a:r>
-          </a:p>
-          <a:p>
-            <a:pPr marL="742950" lvl="1" indent="-285750">
-              <a:buFont typeface="Arial" panose="020B0604020202020204" pitchFamily="34" charset="0"/>
-              <a:buChar char="•"/>
-            </a:pPr>
-            <a:r>
-              <a:rPr lang="en-US" dirty="0"/>
-              <a:t>2016 and 2017 data	</a:t>
-            </a:r>
-          </a:p>
-          <a:p>
-            <a:pPr marL="742950" lvl="1" indent="-285750">
-              <a:buFont typeface="Arial" panose="020B0604020202020204" pitchFamily="34" charset="0"/>
-              <a:buChar char="•"/>
-            </a:pPr>
-            <a:r>
-              <a:rPr lang="en-US" dirty="0"/>
-              <a:t>We are using only the TT bar samples with the </a:t>
-            </a:r>
-            <a:r>
-              <a:rPr lang="en-US" dirty="0" err="1"/>
-              <a:t>Mtt</a:t>
-            </a:r>
-            <a:r>
-              <a:rPr lang="en-US" dirty="0"/>
-              <a:t> cut (both 700-1000GeV and 1000-Inf GeV samples)</a:t>
-            </a:r>
-          </a:p>
-          <a:p>
-            <a:endParaRPr lang="en-US" dirty="0"/>
-          </a:p>
-          <a:p>
-            <a:pPr marL="285750" indent="-285750">
-              <a:buFont typeface="Arial" panose="020B0604020202020204" pitchFamily="34" charset="0"/>
-              <a:buChar char="•"/>
-            </a:pPr>
-            <a:r>
-              <a:rPr lang="en-US" dirty="0"/>
-              <a:t>New “top Tagger” that discriminates top jet candidates and QCD </a:t>
-            </a:r>
-            <a:r>
-              <a:rPr lang="en-US" dirty="0" err="1"/>
-              <a:t>multijet</a:t>
-            </a:r>
-            <a:r>
-              <a:rPr lang="en-US" dirty="0"/>
-              <a:t> background jets</a:t>
-            </a:r>
-          </a:p>
-          <a:p>
-            <a:pPr marL="742950" lvl="1" indent="-285750">
-              <a:buFont typeface="Arial" panose="020B0604020202020204" pitchFamily="34" charset="0"/>
-              <a:buChar char="•"/>
-            </a:pPr>
-            <a:r>
-              <a:rPr lang="en-US" dirty="0"/>
-              <a:t>The new tagger is trained per jet and not per event</a:t>
-            </a:r>
-          </a:p>
-          <a:p>
-            <a:pPr marL="742950" lvl="1" indent="-285750">
-              <a:buFont typeface="Arial" panose="020B0604020202020204" pitchFamily="34" charset="0"/>
-              <a:buChar char="•"/>
-            </a:pPr>
-            <a:r>
-              <a:rPr lang="en-US" dirty="0"/>
-              <a:t>3 separate trainings for each year (2016, 2017, 2018)</a:t>
-            </a:r>
-          </a:p>
-          <a:p>
-            <a:pPr marL="742950" lvl="1" indent="-285750">
-              <a:buFont typeface="Arial" panose="020B0604020202020204" pitchFamily="34" charset="0"/>
-              <a:buChar char="•"/>
-            </a:pPr>
-            <a:r>
-              <a:rPr lang="en-US" dirty="0"/>
-              <a:t>Efficiencies and acceptances for all variables for the 3 separate years</a:t>
-            </a:r>
-          </a:p>
-          <a:p>
-            <a:pPr marL="742950" lvl="1" indent="-285750">
-              <a:buFont typeface="Arial" panose="020B0604020202020204" pitchFamily="34" charset="0"/>
-              <a:buChar char="•"/>
-            </a:pPr>
-            <a:r>
-              <a:rPr lang="en-US" dirty="0"/>
-              <a:t>We have decided on 3 different Working Points for our tagger in order for the Efficiency of the leading jet P</a:t>
-            </a:r>
-            <a:r>
-              <a:rPr lang="en-US" baseline="-25000" dirty="0"/>
-              <a:t>T </a:t>
-            </a:r>
-            <a:r>
-              <a:rPr lang="en-US" dirty="0"/>
-              <a:t> to be </a:t>
-            </a:r>
-            <a:r>
-              <a:rPr lang="en-US" dirty="0" err="1"/>
-              <a:t>si</a:t>
-            </a:r>
-            <a:r>
-              <a:rPr lang="en-US" dirty="0"/>
-              <a:t> similar in all 3 years</a:t>
-            </a:r>
-          </a:p>
-          <a:p>
-            <a:pPr marL="742950" lvl="1" indent="-285750">
-              <a:buFont typeface="Arial" panose="020B0604020202020204" pitchFamily="34" charset="0"/>
-              <a:buChar char="•"/>
-            </a:pPr>
-            <a:r>
-              <a:rPr lang="en-US" dirty="0"/>
-              <a:t>Response matrices for all variables and for every year accordingly</a:t>
-            </a:r>
-          </a:p>
-          <a:p>
-            <a:pPr lvl="1"/>
-            <a:endParaRPr lang="en-US" dirty="0">
-              <a:solidFill>
-                <a:srgbClr val="FF0000"/>
-              </a:solidFill>
-            </a:endParaRPr>
-          </a:p>
-          <a:p>
-            <a:pPr marL="285750" indent="-285750">
-              <a:buFont typeface="Arial" panose="020B0604020202020204" pitchFamily="34" charset="0"/>
-              <a:buChar char="•"/>
-            </a:pPr>
-            <a:r>
-              <a:rPr lang="en-US" dirty="0"/>
-              <a:t>In agreement with other analysis as well as </a:t>
-            </a:r>
-            <a:r>
-              <a:rPr lang="en-US" dirty="0" err="1"/>
-              <a:t>uknown</a:t>
-            </a:r>
-            <a:r>
-              <a:rPr lang="en-US" dirty="0"/>
-              <a:t> CSVv2 Working Points for the 2018 MC , we are using the </a:t>
-            </a:r>
-            <a:r>
-              <a:rPr lang="en-US" dirty="0" err="1"/>
-              <a:t>deepCSV</a:t>
-            </a:r>
-            <a:r>
-              <a:rPr lang="en-US" dirty="0"/>
-              <a:t> b-tagger and not the CSVv2.</a:t>
-            </a:r>
-          </a:p>
-          <a:p>
-            <a:pPr marL="742950" lvl="1" indent="-285750">
-              <a:buFont typeface="Arial" panose="020B0604020202020204" pitchFamily="34" charset="0"/>
-              <a:buChar char="•"/>
-            </a:pPr>
-            <a:r>
-              <a:rPr lang="en-US" dirty="0"/>
-              <a:t>The </a:t>
-            </a:r>
-            <a:r>
-              <a:rPr lang="en-US" dirty="0" err="1"/>
-              <a:t>deepCSV</a:t>
-            </a:r>
-            <a:r>
-              <a:rPr lang="en-US" dirty="0"/>
-              <a:t> tagger is more efficient than the CSVv2 in our analysis</a:t>
-            </a:r>
-          </a:p>
-          <a:p>
-            <a:pPr marL="742950" lvl="1" indent="-285750">
-              <a:buFont typeface="Arial" panose="020B0604020202020204" pitchFamily="34" charset="0"/>
-              <a:buChar char="•"/>
-            </a:pPr>
-            <a:endParaRPr lang="en-US" dirty="0"/>
-          </a:p>
-          <a:p>
-            <a:pPr marL="285750" indent="-285750">
-              <a:buFont typeface="Arial" panose="020B0604020202020204" pitchFamily="34" charset="0"/>
-              <a:buChar char="•"/>
-            </a:pPr>
-            <a:r>
-              <a:rPr lang="en-US" dirty="0"/>
-              <a:t>Extract QCD background shape from data</a:t>
+            <a:r>
+              <a:rPr lang="en-US" sz="1200" dirty="0"/>
+              <a:t>|cos(</a:t>
+            </a:r>
+            <a:r>
+              <a:rPr lang="el-GR" sz="1200" dirty="0"/>
+              <a:t>θ*)</a:t>
+            </a:r>
+            <a:r>
+              <a:rPr lang="en-US" sz="1200" dirty="0"/>
+              <a:t>| </a:t>
+            </a:r>
+            <a:r>
+              <a:rPr lang="en-US" sz="1200" dirty="0" err="1"/>
+              <a:t>parton</a:t>
+            </a:r>
+            <a:r>
+              <a:rPr lang="en-US" sz="1200" dirty="0"/>
+              <a:t>: Sensitivity to BSM physics</a:t>
+            </a:r>
+          </a:p>
+        </p:txBody>
+      </p:sp>
+      <p:pic>
+        <p:nvPicPr>
+          <p:cNvPr id="8" name="Picture 7">
+            <a:extLst>
+              <a:ext uri="{FF2B5EF4-FFF2-40B4-BE49-F238E27FC236}">
+                <a16:creationId xmlns:a16="http://schemas.microsoft.com/office/drawing/2014/main" id="{4C18079C-5201-A440-BADC-0B9207C73458}"/>
+              </a:ext>
+            </a:extLst>
+          </p:cNvPr>
+          <p:cNvPicPr>
+            <a:picLocks noChangeAspect="1"/>
+          </p:cNvPicPr>
+          <p:nvPr/>
+        </p:nvPicPr>
+        <p:blipFill>
+          <a:blip r:embed="rId4">
+            <a:extLst>
+              <a:ext uri="{28A0092B-C50C-407E-A947-70E740481C1C}">
+                <a14:useLocalDpi xmlns:a14="http://schemas.microsoft.com/office/drawing/2010/main" val="0"/>
+              </a:ext>
+            </a:extLst>
+          </a:blip>
+          <a:stretch>
+            <a:fillRect/>
+          </a:stretch>
+        </p:blipFill>
+        <p:spPr>
+          <a:xfrm>
+            <a:off x="5888796" y="3790883"/>
+            <a:ext cx="3136265" cy="1997710"/>
+          </a:xfrm>
+          <a:prstGeom prst="rect">
+            <a:avLst/>
+          </a:prstGeom>
+        </p:spPr>
+      </p:pic>
+      <p:pic>
+        <p:nvPicPr>
+          <p:cNvPr id="13" name="Picture 12">
+            <a:extLst>
+              <a:ext uri="{FF2B5EF4-FFF2-40B4-BE49-F238E27FC236}">
+                <a16:creationId xmlns:a16="http://schemas.microsoft.com/office/drawing/2014/main" id="{4AA1B72E-4BB9-DE44-99E8-17B28454C8A2}"/>
+              </a:ext>
+            </a:extLst>
+          </p:cNvPr>
+          <p:cNvPicPr>
+            <a:picLocks noChangeAspect="1"/>
+          </p:cNvPicPr>
+          <p:nvPr/>
+        </p:nvPicPr>
+        <p:blipFill>
+          <a:blip r:embed="rId5">
+            <a:extLst>
+              <a:ext uri="{28A0092B-C50C-407E-A947-70E740481C1C}">
+                <a14:useLocalDpi xmlns:a14="http://schemas.microsoft.com/office/drawing/2010/main" val="0"/>
+              </a:ext>
+            </a:extLst>
+          </a:blip>
+          <a:stretch>
+            <a:fillRect/>
+          </a:stretch>
+        </p:blipFill>
+        <p:spPr>
+          <a:xfrm>
+            <a:off x="8924361" y="3785641"/>
+            <a:ext cx="3136265" cy="1997710"/>
+          </a:xfrm>
+          <a:prstGeom prst="rect">
+            <a:avLst/>
+          </a:prstGeom>
+        </p:spPr>
+      </p:pic>
+      <p:sp>
+        <p:nvSpPr>
+          <p:cNvPr id="14" name="TextBox 13">
+            <a:extLst>
+              <a:ext uri="{FF2B5EF4-FFF2-40B4-BE49-F238E27FC236}">
+                <a16:creationId xmlns:a16="http://schemas.microsoft.com/office/drawing/2014/main" id="{7D35D76E-AC98-684B-9805-6377EDD6DEDC}"/>
+              </a:ext>
+            </a:extLst>
+          </p:cNvPr>
+          <p:cNvSpPr txBox="1"/>
+          <p:nvPr/>
+        </p:nvSpPr>
+        <p:spPr>
+          <a:xfrm>
+            <a:off x="9759806" y="5794599"/>
+            <a:ext cx="1465373" cy="276999"/>
+          </a:xfrm>
+          <a:prstGeom prst="rect">
+            <a:avLst/>
+          </a:prstGeom>
+          <a:noFill/>
+        </p:spPr>
+        <p:txBody>
+          <a:bodyPr wrap="square" rtlCol="0">
+            <a:spAutoFit/>
+          </a:bodyPr>
+          <a:lstStyle/>
+          <a:p>
+            <a:r>
+              <a:rPr lang="el-GR" sz="1200" dirty="0"/>
+              <a:t>χ </a:t>
+            </a:r>
+            <a:r>
+              <a:rPr lang="en-US" sz="1200" dirty="0" err="1"/>
+              <a:t>parton</a:t>
+            </a:r>
+            <a:r>
+              <a:rPr lang="en-US" sz="1200" dirty="0"/>
+              <a:t> distribution</a:t>
             </a:r>
           </a:p>
         </p:txBody>
@@ -8664,8 +8941,8 @@
         </p:nvSpPr>
         <p:spPr>
           <a:xfrm>
-            <a:off x="128155" y="0"/>
-            <a:ext cx="11783049" cy="954107"/>
+            <a:off x="111965" y="83975"/>
+            <a:ext cx="11783049" cy="523220"/>
           </a:xfrm>
           <a:prstGeom prst="rect">
             <a:avLst/>
@@ -8680,11 +8957,16 @@
           <a:p>
             <a:r>
               <a:rPr lang="en-US" sz="2800" u="sng" dirty="0"/>
-              <a:t>Future Steps</a:t>
-            </a:r>
-          </a:p>
-          <a:p>
-            <a:endParaRPr lang="en-US" sz="2800" u="sng" dirty="0"/>
+              <a:t>Status full </a:t>
+            </a:r>
+            <a:r>
+              <a:rPr lang="en-US" sz="2800" u="sng" dirty="0" err="1"/>
+              <a:t>RunII</a:t>
+            </a:r>
+            <a:r>
+              <a:rPr lang="en-US" sz="2800" u="sng" dirty="0"/>
+              <a:t> Data</a:t>
+            </a:r>
           </a:p>
         </p:txBody>
       </p:sp>
@@ -8702,8 +8984,8 @@
         </p:nvSpPr>
         <p:spPr>
           <a:xfrm>
-            <a:off x="238990" y="758536"/>
-            <a:ext cx="11953009" cy="3416320"/>
+            <a:off x="296986" y="353291"/>
+            <a:ext cx="11824854" cy="2308324"/>
           </a:xfrm>
           <a:prstGeom prst="rect">
             <a:avLst/>
@@ -8716,26 +8998,178 @@
           </a:bodyPr>
           <a:lstStyle/>
           <a:p>
+            <a:endParaRPr lang="en-US" dirty="0"/>
+          </a:p>
+          <a:p>
             <a:pPr marL="285750" indent="-285750">
               <a:buFont typeface="Arial" panose="020B0604020202020204" pitchFamily="34" charset="0"/>
               <a:buChar char="•"/>
             </a:pPr>
             <a:r>
               <a:rPr lang="en-US" dirty="0"/>
-              <a:t>Proceed with the fit for the QCD </a:t>
+              <a:t>New “top Tagger” that discriminates top jet candidates and QCD </a:t>
             </a:r>
             <a:r>
               <a:rPr lang="en-US" dirty="0" err="1"/>
-              <a:t>bkg</a:t>
+              <a:t>multijet</a:t>
             </a:r>
             <a:r>
               <a:rPr lang="en-US" dirty="0"/>
-              <a:t> extraction, extract the signal S(x) where x is each contemplated variable</a:t>
-            </a:r>
-          </a:p>
-          <a:p>
-            <a:endParaRPr lang="en-US" dirty="0"/>
-          </a:p>
+              <a:t> background jets</a:t>
+            </a:r>
+          </a:p>
+          <a:p>
+            <a:pPr marL="742950" lvl="1" indent="-285750">
+              <a:buFont typeface="Arial" panose="020B0604020202020204" pitchFamily="34" charset="0"/>
+              <a:buChar char="•"/>
+            </a:pPr>
+            <a:r>
+              <a:rPr lang="en-US" dirty="0"/>
+              <a:t>The new tagger is trained per jet and not per event</a:t>
+            </a:r>
+          </a:p>
+          <a:p>
+            <a:pPr marL="742950" lvl="1" indent="-285750">
+              <a:buFont typeface="Arial" panose="020B0604020202020204" pitchFamily="34" charset="0"/>
+              <a:buChar char="•"/>
+            </a:pPr>
+            <a:r>
+              <a:rPr lang="en-US" dirty="0"/>
+              <a:t>3 separate trainings for each year (2016, 2017, 2018)</a:t>
+            </a:r>
+          </a:p>
+          <a:p>
+            <a:pPr marL="742950" lvl="1" indent="-285750">
+              <a:buFont typeface="Arial" panose="020B0604020202020204" pitchFamily="34" charset="0"/>
+              <a:buChar char="•"/>
+            </a:pPr>
+            <a:r>
+              <a:rPr lang="en-US" dirty="0"/>
+              <a:t>Efficiencies and acceptances for all variables for the 3 separate years</a:t>
+            </a:r>
+          </a:p>
+          <a:p>
+            <a:pPr marL="742950" lvl="1" indent="-285750">
+              <a:buFont typeface="Arial" panose="020B0604020202020204" pitchFamily="34" charset="0"/>
+              <a:buChar char="•"/>
+            </a:pPr>
+            <a:r>
+              <a:rPr lang="en-US" dirty="0"/>
+              <a:t>We have decided on 3 different Working Points for our tagger in order for the Efficiency of the leading jet P</a:t>
+            </a:r>
+            <a:r>
+              <a:rPr lang="en-US" baseline="-25000" dirty="0"/>
+              <a:t>T </a:t>
+            </a:r>
+            <a:r>
+              <a:rPr lang="en-US" dirty="0"/>
+              <a:t> to be similar in all 3 years</a:t>
+            </a:r>
+          </a:p>
+          <a:p>
+            <a:pPr marL="742950" lvl="1" indent="-285750">
+              <a:buFont typeface="Arial" panose="020B0604020202020204" pitchFamily="34" charset="0"/>
+              <a:buChar char="•"/>
+            </a:pPr>
+            <a:r>
+              <a:rPr lang="en-US" dirty="0"/>
+              <a:t>Response matrices for all variables and for every year accordingly</a:t>
+            </a:r>
+          </a:p>
+        </p:txBody>
+      </p:sp>
+      <p:pic>
+        <p:nvPicPr>
+          <p:cNvPr id="9" name="Picture 8">
+            <a:extLst>
+              <a:ext uri="{FF2B5EF4-FFF2-40B4-BE49-F238E27FC236}">
+                <a16:creationId xmlns:a16="http://schemas.microsoft.com/office/drawing/2014/main" id="{CFF81FF2-146A-7147-8DE1-6AE8C45BFD54}"/>
+              </a:ext>
+            </a:extLst>
+          </p:cNvPr>
+          <p:cNvPicPr>
+            <a:picLocks noChangeAspect="1"/>
+          </p:cNvPicPr>
+          <p:nvPr/>
+        </p:nvPicPr>
+        <p:blipFill>
+          <a:blip r:embed="rId2"/>
+          <a:stretch>
+            <a:fillRect/>
+          </a:stretch>
+        </p:blipFill>
+        <p:spPr>
+          <a:xfrm>
+            <a:off x="4989490" y="2906105"/>
+            <a:ext cx="3593318" cy="2954964"/>
+          </a:xfrm>
+          <a:prstGeom prst="rect">
+            <a:avLst/>
+          </a:prstGeom>
+        </p:spPr>
+      </p:pic>
+      <p:sp>
+        <p:nvSpPr>
+          <p:cNvPr id="10" name="TextBox 9">
+            <a:extLst>
+              <a:ext uri="{FF2B5EF4-FFF2-40B4-BE49-F238E27FC236}">
+                <a16:creationId xmlns:a16="http://schemas.microsoft.com/office/drawing/2014/main" id="{DD4D7F97-8ADA-C64F-B158-A9A96251D716}"/>
+              </a:ext>
+            </a:extLst>
+          </p:cNvPr>
+          <p:cNvSpPr txBox="1"/>
+          <p:nvPr/>
+        </p:nvSpPr>
+        <p:spPr>
+          <a:xfrm>
+            <a:off x="6518481" y="5855442"/>
+            <a:ext cx="4128654" cy="307777"/>
+          </a:xfrm>
+          <a:prstGeom prst="rect">
+            <a:avLst/>
+          </a:prstGeom>
+          <a:noFill/>
+        </p:spPr>
+        <p:txBody>
+          <a:bodyPr wrap="square" rtlCol="0">
+            <a:spAutoFit/>
+          </a:bodyPr>
+          <a:lstStyle/>
+          <a:p>
+            <a:r>
+              <a:rPr lang="en-US" sz="1400" dirty="0"/>
+              <a:t>Efficiency and Acceptance comparison for ‘16, ‘17, ‘18</a:t>
+            </a:r>
+          </a:p>
+        </p:txBody>
+      </p:sp>
+      <p:sp>
+        <p:nvSpPr>
+          <p:cNvPr id="11" name="TextBox 10">
+            <a:extLst>
+              <a:ext uri="{FF2B5EF4-FFF2-40B4-BE49-F238E27FC236}">
+                <a16:creationId xmlns:a16="http://schemas.microsoft.com/office/drawing/2014/main" id="{B5147070-3F01-BE46-97C6-446CB5949633}"/>
+              </a:ext>
+            </a:extLst>
+          </p:cNvPr>
+          <p:cNvSpPr txBox="1"/>
+          <p:nvPr/>
+        </p:nvSpPr>
+        <p:spPr>
+          <a:xfrm>
+            <a:off x="111965" y="2993120"/>
+            <a:ext cx="4644736" cy="2862322"/>
+          </a:xfrm>
+          <a:prstGeom prst="rect">
+            <a:avLst/>
+          </a:prstGeom>
+          <a:noFill/>
+        </p:spPr>
+        <p:txBody>
+          <a:bodyPr wrap="square" rtlCol="0">
+            <a:spAutoFit/>
+          </a:bodyPr>
+          <a:lstStyle/>
           <a:p>
             <a:pPr marL="285750" indent="-285750">
               <a:buFont typeface="Arial" panose="020B0604020202020204" pitchFamily="34" charset="0"/>
@@ -8743,7 +9177,53 @@
             </a:pPr>
             <a:r>
               <a:rPr lang="en-US" dirty="0"/>
-              <a:t>Unfold to the Particle and Parton Phase spaces for each variable</a:t>
+              <a:t>In agreement with other analysis as well as unknown CSVv2 Working Points for the 2018 MC , we are using the </a:t>
+            </a:r>
+            <a:r>
+              <a:rPr lang="en-US" dirty="0" err="1"/>
+              <a:t>deepCSV</a:t>
+            </a:r>
+            <a:r>
+              <a:rPr lang="en-US" dirty="0"/>
+              <a:t> b-tagger and not the CSVv2</a:t>
+            </a:r>
+          </a:p>
+          <a:p>
+            <a:pPr marL="285750" indent="-285750">
+              <a:buFont typeface="Arial" panose="020B0604020202020204" pitchFamily="34" charset="0"/>
+              <a:buChar char="•"/>
+            </a:pPr>
+            <a:r>
+              <a:rPr lang="en-US" dirty="0"/>
+              <a:t>QCD closure tests</a:t>
+            </a:r>
+          </a:p>
+          <a:p>
+            <a:pPr marL="742950" lvl="1" indent="-285750">
+              <a:buFont typeface="Arial" panose="020B0604020202020204" pitchFamily="34" charset="0"/>
+              <a:buChar char="•"/>
+            </a:pPr>
+            <a:r>
+              <a:rPr lang="en-US" dirty="0"/>
+              <a:t>Shape comparison between signal and control region</a:t>
+            </a:r>
+          </a:p>
+          <a:p>
+            <a:pPr marL="285750" indent="-285750">
+              <a:buFont typeface="Arial" panose="020B0604020202020204" pitchFamily="34" charset="0"/>
+              <a:buChar char="•"/>
+            </a:pPr>
+            <a:r>
+              <a:rPr lang="en-US" dirty="0"/>
+              <a:t>Data driven method to estimate the QCD </a:t>
+            </a:r>
+            <a:r>
+              <a:rPr lang="en-US" dirty="0" err="1"/>
+              <a:t>bkg</a:t>
+            </a:r>
+            <a:r>
+              <a:rPr lang="en-US" dirty="0"/>
+              <a:t> shape</a:t>
             </a:r>
           </a:p>
           <a:p>
@@ -8753,6 +9233,150 @@
             </a:pPr>
             <a:endParaRPr lang="en-US" dirty="0"/>
           </a:p>
+        </p:txBody>
+      </p:sp>
+      <p:pic>
+        <p:nvPicPr>
+          <p:cNvPr id="5" name="Picture 4">
+            <a:extLst>
+              <a:ext uri="{FF2B5EF4-FFF2-40B4-BE49-F238E27FC236}">
+                <a16:creationId xmlns:a16="http://schemas.microsoft.com/office/drawing/2014/main" id="{F4613592-13EE-1F40-B6B2-987CAB8D9459}"/>
+              </a:ext>
+            </a:extLst>
+          </p:cNvPr>
+          <p:cNvPicPr>
+            <a:picLocks noChangeAspect="1"/>
+          </p:cNvPicPr>
+          <p:nvPr/>
+        </p:nvPicPr>
+        <p:blipFill>
+          <a:blip r:embed="rId3"/>
+          <a:stretch>
+            <a:fillRect/>
+          </a:stretch>
+        </p:blipFill>
+        <p:spPr>
+          <a:xfrm>
+            <a:off x="8309929" y="2906105"/>
+            <a:ext cx="3519499" cy="2949337"/>
+          </a:xfrm>
+          <a:prstGeom prst="rect">
+            <a:avLst/>
+          </a:prstGeom>
+        </p:spPr>
+      </p:pic>
+    </p:spTree>
+    <p:extLst>
+      <p:ext uri="{BB962C8B-B14F-4D97-AF65-F5344CB8AC3E}">
+        <p14:creationId xmlns:p14="http://schemas.microsoft.com/office/powerpoint/2010/main" val="1759050764"/>
+      </p:ext>
+    </p:extLst>
+  </p:cSld>
+  <p:clrMapOvr>
+    <a:masterClrMapping/>
+  </p:clrMapOvr>
+</p:sld>
+</file>
+
+<file path=ppt/slides/slide5.xml><?xml version="1.0" encoding="utf-8"?>
+<p:sld xmlns:a="http://schemas.openxmlformats.org/drawingml/2006/main" xmlns:r="http://schemas.openxmlformats.org/officeDocument/2006/relationships" xmlns:p="http://schemas.openxmlformats.org/presentationml/2006/main">
+  <p:cSld>
+    <p:spTree>
+      <p:nvGrpSpPr>
+        <p:cNvPr id="1" name=""/>
+        <p:cNvGrpSpPr/>
+        <p:nvPr/>
+      </p:nvGrpSpPr>
+      <p:grpSpPr>
+        <a:xfrm>
+          <a:off x="0" y="0"/>
+          <a:ext cx="0" cy="0"/>
+          <a:chOff x="0" y="0"/>
+          <a:chExt cx="0" cy="0"/>
+        </a:xfrm>
+      </p:grpSpPr>
+      <p:sp>
+        <p:nvSpPr>
+          <p:cNvPr id="3" name="Footer Placeholder 2"/>
+          <p:cNvSpPr>
+            <a:spLocks noGrp="1"/>
+          </p:cNvSpPr>
+          <p:nvPr>
+            <p:ph type="ftr" sz="quarter" idx="11"/>
+          </p:nvPr>
+        </p:nvSpPr>
+        <p:spPr/>
+        <p:txBody>
+          <a:bodyPr/>
+          <a:lstStyle/>
+          <a:p>
+            <a:r>
+              <a:rPr lang="fi-FI"/>
+              <a:t>NTUA</a:t>
+            </a:r>
+            <a:endParaRPr lang="en-US" dirty="0"/>
+          </a:p>
+        </p:txBody>
+      </p:sp>
+      <p:sp>
+        <p:nvSpPr>
+          <p:cNvPr id="7" name="TextBox 6"/>
+          <p:cNvSpPr txBox="1"/>
+          <p:nvPr/>
+        </p:nvSpPr>
+        <p:spPr>
+          <a:xfrm>
+            <a:off x="128155" y="0"/>
+            <a:ext cx="11783049" cy="954107"/>
+          </a:xfrm>
+          <a:prstGeom prst="rect">
+            <a:avLst/>
+          </a:prstGeom>
+          <a:noFill/>
+        </p:spPr>
+        <p:txBody>
+          <a:bodyPr wrap="square" rtlCol="0">
+            <a:spAutoFit/>
+          </a:bodyPr>
+          <a:lstStyle/>
+          <a:p>
+            <a:r>
+              <a:rPr lang="en-US" sz="2800" u="sng" dirty="0"/>
+              <a:t>Summary</a:t>
+            </a:r>
+          </a:p>
+          <a:p>
+            <a:endParaRPr lang="en-US" sz="2800" u="sng" dirty="0"/>
+          </a:p>
+        </p:txBody>
+      </p:sp>
+      <p:sp>
+        <p:nvSpPr>
+          <p:cNvPr id="2" name="TextBox 1">
+            <a:extLst>
+              <a:ext uri="{FF2B5EF4-FFF2-40B4-BE49-F238E27FC236}">
+                <a16:creationId xmlns:a16="http://schemas.microsoft.com/office/drawing/2014/main" id="{F7724272-DF9E-9B47-A3AB-AE0DAAD2F54A}"/>
+              </a:ext>
+            </a:extLst>
+          </p:cNvPr>
+          <p:cNvSpPr txBox="1"/>
+          <p:nvPr/>
+        </p:nvSpPr>
+        <p:spPr>
+          <a:xfrm>
+            <a:off x="238990" y="758536"/>
+            <a:ext cx="11953009" cy="3693319"/>
+          </a:xfrm>
+          <a:prstGeom prst="rect">
+            <a:avLst/>
+          </a:prstGeom>
+          <a:noFill/>
+        </p:spPr>
+        <p:txBody>
+          <a:bodyPr wrap="square" rtlCol="0">
+            <a:spAutoFit/>
+          </a:bodyPr>
+          <a:lstStyle/>
           <a:p>
             <a:pPr marL="285750" indent="-285750">
               <a:buFont typeface="Arial" panose="020B0604020202020204" pitchFamily="34" charset="0"/>
@@ -8760,46 +9384,106 @@
             </a:pPr>
             <a:r>
               <a:rPr lang="en-US" dirty="0"/>
-              <a:t>Neural Network instead of BDT</a:t>
-            </a:r>
+              <a:t>Finalize as soon as possible the 2016 publication (TOP-18-013)</a:t>
+            </a:r>
+          </a:p>
+          <a:p>
+            <a:endParaRPr lang="en-US" dirty="0"/>
           </a:p>
           <a:p>
             <a:pPr marL="285750" indent="-285750">
               <a:buFont typeface="Arial" panose="020B0604020202020204" pitchFamily="34" charset="0"/>
               <a:buChar char="•"/>
             </a:pPr>
-            <a:endParaRPr lang="en-US" dirty="0"/>
-          </a:p>
-          <a:p>
-            <a:pPr marL="285750" indent="-285750">
+            <a:r>
+              <a:rPr lang="en-US" dirty="0"/>
+              <a:t>Full </a:t>
+            </a:r>
+            <a:r>
+              <a:rPr lang="en-US" dirty="0" err="1"/>
+              <a:t>RunII</a:t>
+            </a:r>
+            <a:r>
+              <a:rPr lang="en-US" dirty="0"/>
+              <a:t> analysis</a:t>
+            </a:r>
+          </a:p>
+          <a:p>
+            <a:pPr marL="742950" lvl="1" indent="-285750">
               <a:buFont typeface="Arial" panose="020B0604020202020204" pitchFamily="34" charset="0"/>
               <a:buChar char="•"/>
             </a:pPr>
             <a:r>
-              <a:rPr lang="en-US"/>
-              <a:t>MC </a:t>
-            </a:r>
-            <a:r>
               <a:rPr lang="en-US" dirty="0"/>
-              <a:t>variations</a:t>
-            </a:r>
-          </a:p>
-          <a:p>
-            <a:pPr marL="285750" indent="-285750">
+              <a:t>Person power: 2 PhD students and 2 faculty members</a:t>
+            </a:r>
+          </a:p>
+          <a:p>
+            <a:pPr marL="742950" lvl="1" indent="-285750">
               <a:buFont typeface="Arial" panose="020B0604020202020204" pitchFamily="34" charset="0"/>
               <a:buChar char="•"/>
             </a:pPr>
-            <a:endParaRPr lang="en-US" dirty="0"/>
-          </a:p>
-          <a:p>
-            <a:pPr marL="285750" indent="-285750">
+            <a:r>
+              <a:rPr lang="en-US" dirty="0"/>
+              <a:t>Expand the 2016 analysis by adding more variables, attempt BSM constraints within the EFT framework (Effective Field Theory) and double differential cross section measurements</a:t>
+            </a:r>
+          </a:p>
+          <a:p>
+            <a:pPr marL="742950" lvl="1" indent="-285750">
               <a:buFont typeface="Arial" panose="020B0604020202020204" pitchFamily="34" charset="0"/>
               <a:buChar char="•"/>
             </a:pPr>
             <a:r>
               <a:rPr lang="en-US" dirty="0"/>
-              <a:t>Ultra legacy file</a:t>
-            </a:r>
+              <a:t>Timescale: End of 2020/ Winter Conference 2021</a:t>
+            </a:r>
+          </a:p>
+          <a:p>
+            <a:pPr marL="742950" lvl="1" indent="-285750">
+              <a:buFont typeface="Arial" panose="020B0604020202020204" pitchFamily="34" charset="0"/>
+              <a:buChar char="•"/>
+            </a:pPr>
+            <a:r>
+              <a:rPr lang="en-US" dirty="0"/>
+              <a:t>Significance Progress on software infrastructure and critical analysis tools (</a:t>
+            </a:r>
+            <a:r>
+              <a:rPr lang="en-US" dirty="0" err="1"/>
+              <a:t>topTagger</a:t>
+            </a:r>
+            <a:r>
+              <a:rPr lang="en-US" dirty="0"/>
+              <a:t>)</a:t>
+            </a:r>
+          </a:p>
+          <a:p>
+            <a:pPr marL="742950" lvl="1" indent="-285750">
+              <a:buFont typeface="Arial" panose="020B0604020202020204" pitchFamily="34" charset="0"/>
+              <a:buChar char="•"/>
+            </a:pPr>
+            <a:r>
+              <a:rPr lang="en-US" dirty="0"/>
+              <a:t>We plan to report regularly in </a:t>
+            </a:r>
+            <a:r>
+              <a:rPr lang="en-US" dirty="0" err="1"/>
+              <a:t>forecoming</a:t>
+            </a:r>
+            <a:r>
+              <a:rPr lang="en-US" dirty="0"/>
+              <a:t> </a:t>
+            </a:r>
+            <a:r>
+              <a:rPr lang="en-US" dirty="0" err="1"/>
+              <a:t>ttX</a:t>
+            </a:r>
+            <a:r>
+              <a:rPr lang="en-US" dirty="0"/>
+              <a:t> meetings</a:t>
+            </a:r>
+          </a:p>
+          <a:p>
+            <a:endParaRPr lang="en-US" dirty="0"/>
           </a:p>
           <a:p>
             <a:pPr marL="285750" indent="-285750">

</xml_diff>